<commit_message>
Bunch of improvements and features (change photos, change interval, new template, etc.) and bug fixes (transpose, etc.)
</commit_message>
<xml_diff>
--- a/static/img/template2.pptx
+++ b/static/img/template2.pptx
@@ -288,7 +288,7 @@
           <a:p>
             <a:fld id="{B4107273-E6DD-40D4-B990-AC7556801107}" type="datetimeFigureOut">
               <a:rPr lang="en-IN" smtClean="0"/>
-              <a:t>05-06-2014</a:t>
+              <a:t>18-06-2014</a:t>
             </a:fld>
             <a:endParaRPr lang="en-IN"/>
           </a:p>
@@ -458,7 +458,7 @@
           <a:p>
             <a:fld id="{B4107273-E6DD-40D4-B990-AC7556801107}" type="datetimeFigureOut">
               <a:rPr lang="en-IN" smtClean="0"/>
-              <a:t>05-06-2014</a:t>
+              <a:t>18-06-2014</a:t>
             </a:fld>
             <a:endParaRPr lang="en-IN"/>
           </a:p>
@@ -638,7 +638,7 @@
           <a:p>
             <a:fld id="{B4107273-E6DD-40D4-B990-AC7556801107}" type="datetimeFigureOut">
               <a:rPr lang="en-IN" smtClean="0"/>
-              <a:t>05-06-2014</a:t>
+              <a:t>18-06-2014</a:t>
             </a:fld>
             <a:endParaRPr lang="en-IN"/>
           </a:p>
@@ -808,7 +808,7 @@
           <a:p>
             <a:fld id="{B4107273-E6DD-40D4-B990-AC7556801107}" type="datetimeFigureOut">
               <a:rPr lang="en-IN" smtClean="0"/>
-              <a:t>05-06-2014</a:t>
+              <a:t>18-06-2014</a:t>
             </a:fld>
             <a:endParaRPr lang="en-IN"/>
           </a:p>
@@ -1054,7 +1054,7 @@
           <a:p>
             <a:fld id="{B4107273-E6DD-40D4-B990-AC7556801107}" type="datetimeFigureOut">
               <a:rPr lang="en-IN" smtClean="0"/>
-              <a:t>05-06-2014</a:t>
+              <a:t>18-06-2014</a:t>
             </a:fld>
             <a:endParaRPr lang="en-IN"/>
           </a:p>
@@ -1342,7 +1342,7 @@
           <a:p>
             <a:fld id="{B4107273-E6DD-40D4-B990-AC7556801107}" type="datetimeFigureOut">
               <a:rPr lang="en-IN" smtClean="0"/>
-              <a:t>05-06-2014</a:t>
+              <a:t>18-06-2014</a:t>
             </a:fld>
             <a:endParaRPr lang="en-IN"/>
           </a:p>
@@ -1769,7 +1769,7 @@
           <a:p>
             <a:fld id="{B4107273-E6DD-40D4-B990-AC7556801107}" type="datetimeFigureOut">
               <a:rPr lang="en-IN" smtClean="0"/>
-              <a:t>05-06-2014</a:t>
+              <a:t>18-06-2014</a:t>
             </a:fld>
             <a:endParaRPr lang="en-IN"/>
           </a:p>
@@ -1887,7 +1887,7 @@
           <a:p>
             <a:fld id="{B4107273-E6DD-40D4-B990-AC7556801107}" type="datetimeFigureOut">
               <a:rPr lang="en-IN" smtClean="0"/>
-              <a:t>05-06-2014</a:t>
+              <a:t>18-06-2014</a:t>
             </a:fld>
             <a:endParaRPr lang="en-IN"/>
           </a:p>
@@ -1982,7 +1982,7 @@
           <a:p>
             <a:fld id="{B4107273-E6DD-40D4-B990-AC7556801107}" type="datetimeFigureOut">
               <a:rPr lang="en-IN" smtClean="0"/>
-              <a:t>05-06-2014</a:t>
+              <a:t>18-06-2014</a:t>
             </a:fld>
             <a:endParaRPr lang="en-IN"/>
           </a:p>
@@ -2259,7 +2259,7 @@
           <a:p>
             <a:fld id="{B4107273-E6DD-40D4-B990-AC7556801107}" type="datetimeFigureOut">
               <a:rPr lang="en-IN" smtClean="0"/>
-              <a:t>05-06-2014</a:t>
+              <a:t>18-06-2014</a:t>
             </a:fld>
             <a:endParaRPr lang="en-IN"/>
           </a:p>
@@ -2512,7 +2512,7 @@
           <a:p>
             <a:fld id="{B4107273-E6DD-40D4-B990-AC7556801107}" type="datetimeFigureOut">
               <a:rPr lang="en-IN" smtClean="0"/>
-              <a:t>05-06-2014</a:t>
+              <a:t>18-06-2014</a:t>
             </a:fld>
             <a:endParaRPr lang="en-IN"/>
           </a:p>
@@ -2725,7 +2725,7 @@
           <a:p>
             <a:fld id="{B4107273-E6DD-40D4-B990-AC7556801107}" type="datetimeFigureOut">
               <a:rPr lang="en-IN" smtClean="0"/>
-              <a:t>05-06-2014</a:t>
+              <a:t>18-06-2014</a:t>
             </a:fld>
             <a:endParaRPr lang="en-IN"/>
           </a:p>
@@ -3365,12 +3365,12 @@
           <a:p>
             <a:pPr algn="ctr"/>
             <a:r>
-              <a:rPr lang="en-IN" smtClean="0">
+              <a:rPr lang="en-IN" dirty="0" smtClean="0">
                 <a:latin typeface="Lucida Handwriting" panose="03010101010101010101" pitchFamily="66" charset="0"/>
               </a:rPr>
               <a:t>Scared</a:t>
             </a:r>
-            <a:endParaRPr lang="en-IN">
+            <a:endParaRPr lang="en-IN" dirty="0">
               <a:latin typeface="Lucida Handwriting" panose="03010101010101010101" pitchFamily="66" charset="0"/>
             </a:endParaRPr>
           </a:p>

</xml_diff>